<commit_message>
M0127CC-8 How-to Foundation Library fix border
</commit_message>
<xml_diff>
--- a/FoundationLibrary-Get-Started/overview.pptx
+++ b/FoundationLibrary-Get-Started/overview.pptx
@@ -243,7 +243,7 @@
           <a:p>
             <a:fld id="{976E5056-CFED-4EFF-9BD5-4AA3836C5A35}" type="datetimeFigureOut">
               <a:rPr lang="en-US" smtClean="0"/>
-              <a:t>3/1/2018</a:t>
+              <a:t>3/5/2018</a:t>
             </a:fld>
             <a:endParaRPr lang="en-US"/>
           </a:p>
@@ -413,7 +413,7 @@
           <a:p>
             <a:fld id="{976E5056-CFED-4EFF-9BD5-4AA3836C5A35}" type="datetimeFigureOut">
               <a:rPr lang="en-US" smtClean="0"/>
-              <a:t>3/1/2018</a:t>
+              <a:t>3/5/2018</a:t>
             </a:fld>
             <a:endParaRPr lang="en-US"/>
           </a:p>
@@ -593,7 +593,7 @@
           <a:p>
             <a:fld id="{976E5056-CFED-4EFF-9BD5-4AA3836C5A35}" type="datetimeFigureOut">
               <a:rPr lang="en-US" smtClean="0"/>
-              <a:t>3/1/2018</a:t>
+              <a:t>3/5/2018</a:t>
             </a:fld>
             <a:endParaRPr lang="en-US"/>
           </a:p>
@@ -763,7 +763,7 @@
           <a:p>
             <a:fld id="{976E5056-CFED-4EFF-9BD5-4AA3836C5A35}" type="datetimeFigureOut">
               <a:rPr lang="en-US" smtClean="0"/>
-              <a:t>3/1/2018</a:t>
+              <a:t>3/5/2018</a:t>
             </a:fld>
             <a:endParaRPr lang="en-US"/>
           </a:p>
@@ -1009,7 +1009,7 @@
           <a:p>
             <a:fld id="{976E5056-CFED-4EFF-9BD5-4AA3836C5A35}" type="datetimeFigureOut">
               <a:rPr lang="en-US" smtClean="0"/>
-              <a:t>3/1/2018</a:t>
+              <a:t>3/5/2018</a:t>
             </a:fld>
             <a:endParaRPr lang="en-US"/>
           </a:p>
@@ -1241,7 +1241,7 @@
           <a:p>
             <a:fld id="{976E5056-CFED-4EFF-9BD5-4AA3836C5A35}" type="datetimeFigureOut">
               <a:rPr lang="en-US" smtClean="0"/>
-              <a:t>3/1/2018</a:t>
+              <a:t>3/5/2018</a:t>
             </a:fld>
             <a:endParaRPr lang="en-US"/>
           </a:p>
@@ -1608,7 +1608,7 @@
           <a:p>
             <a:fld id="{976E5056-CFED-4EFF-9BD5-4AA3836C5A35}" type="datetimeFigureOut">
               <a:rPr lang="en-US" smtClean="0"/>
-              <a:t>3/1/2018</a:t>
+              <a:t>3/5/2018</a:t>
             </a:fld>
             <a:endParaRPr lang="en-US"/>
           </a:p>
@@ -1726,7 +1726,7 @@
           <a:p>
             <a:fld id="{976E5056-CFED-4EFF-9BD5-4AA3836C5A35}" type="datetimeFigureOut">
               <a:rPr lang="en-US" smtClean="0"/>
-              <a:t>3/1/2018</a:t>
+              <a:t>3/5/2018</a:t>
             </a:fld>
             <a:endParaRPr lang="en-US"/>
           </a:p>
@@ -1821,7 +1821,7 @@
           <a:p>
             <a:fld id="{976E5056-CFED-4EFF-9BD5-4AA3836C5A35}" type="datetimeFigureOut">
               <a:rPr lang="en-US" smtClean="0"/>
-              <a:t>3/1/2018</a:t>
+              <a:t>3/5/2018</a:t>
             </a:fld>
             <a:endParaRPr lang="en-US"/>
           </a:p>
@@ -2098,7 +2098,7 @@
           <a:p>
             <a:fld id="{976E5056-CFED-4EFF-9BD5-4AA3836C5A35}" type="datetimeFigureOut">
               <a:rPr lang="en-US" smtClean="0"/>
-              <a:t>3/1/2018</a:t>
+              <a:t>3/5/2018</a:t>
             </a:fld>
             <a:endParaRPr lang="en-US"/>
           </a:p>
@@ -2351,7 +2351,7 @@
           <a:p>
             <a:fld id="{976E5056-CFED-4EFF-9BD5-4AA3836C5A35}" type="datetimeFigureOut">
               <a:rPr lang="en-US" smtClean="0"/>
-              <a:t>3/1/2018</a:t>
+              <a:t>3/5/2018</a:t>
             </a:fld>
             <a:endParaRPr lang="en-US"/>
           </a:p>
@@ -2564,7 +2564,7 @@
           <a:p>
             <a:fld id="{976E5056-CFED-4EFF-9BD5-4AA3836C5A35}" type="datetimeFigureOut">
               <a:rPr lang="en-US" smtClean="0"/>
-              <a:t>3/1/2018</a:t>
+              <a:t>3/5/2018</a:t>
             </a:fld>
             <a:endParaRPr lang="en-US"/>
           </a:p>
@@ -3124,6 +3124,13 @@
           <a:solidFill>
             <a:schemeClr val="accent2"/>
           </a:solidFill>
+          <a:ln>
+            <a:solidFill>
+              <a:schemeClr val="accent2">
+                <a:lumMod val="75000"/>
+              </a:schemeClr>
+            </a:solidFill>
+          </a:ln>
         </p:spPr>
         <p:style>
           <a:lnRef idx="2">
@@ -3161,7 +3168,6 @@
               <a:rPr lang="en-US" sz="1000" b="1" dirty="0" smtClean="0"/>
               <a:t>methods Implementation</a:t>
             </a:r>
-            <a:endParaRPr lang="en-US" sz="1000" b="1" dirty="0" smtClean="0"/>
           </a:p>
         </p:txBody>
       </p:sp>
@@ -3213,19 +3219,11 @@
             <a:pPr algn="ctr"/>
             <a:r>
               <a:rPr lang="en-US" sz="1000" b="1" smtClean="0"/>
-              <a:t>Natives</a:t>
-            </a:r>
-            <a:r>
-              <a:rPr lang="en-US" sz="1000" b="1" smtClean="0"/>
-              <a:t> </a:t>
+              <a:t>Natives </a:t>
             </a:r>
             <a:r>
               <a:rPr lang="en-US" sz="1000" b="1" dirty="0" smtClean="0"/>
-              <a:t>methods </a:t>
-            </a:r>
-            <a:r>
-              <a:rPr lang="en-US" sz="1000" b="1" dirty="0" smtClean="0"/>
-              <a:t>Implementation</a:t>
+              <a:t>methods Implementation</a:t>
             </a:r>
             <a:r>
               <a:rPr lang="en-US" sz="1000" dirty="0" smtClean="0"/>

</xml_diff>